<commit_message>
fist & last commit
</commit_message>
<xml_diff>
--- a/maquette.pptx
+++ b/maquette.pptx
@@ -5,8 +5,7 @@
     <p:sldMasterId id="2147483660" r:id="rId1"/>
   </p:sldMasterIdLst>
   <p:sldIdLst>
-    <p:sldId id="256" r:id="rId2"/>
-    <p:sldId id="257" r:id="rId3"/>
+    <p:sldId id="257" r:id="rId2"/>
   </p:sldIdLst>
   <p:sldSz cx="6858000" cy="12192000"/>
   <p:notesSz cx="6858000" cy="9144000"/>
@@ -105,6 +104,11 @@
       </a:defRPr>
     </a:lvl9pPr>
   </p:defaultTextStyle>
+  <p:extLst>
+    <p:ext uri="{EFAFB233-063F-42B5-8137-9DF3F51BA10A}">
+      <p15:sldGuideLst xmlns:p15="http://schemas.microsoft.com/office/powerpoint/2012/main"/>
+    </p:ext>
+  </p:extLst>
 </p:presentation>
 </file>
 
@@ -239,7 +243,7 @@
           <a:p>
             <a:fld id="{4A19112C-D1F7-4C7E-AFD6-5B38FDB92513}" type="datetimeFigureOut">
               <a:rPr lang="fr-FR" smtClean="0"/>
-              <a:t>18/12/2023</a:t>
+              <a:t>21/12/2023</a:t>
             </a:fld>
             <a:endParaRPr lang="fr-FR"/>
           </a:p>
@@ -409,7 +413,7 @@
           <a:p>
             <a:fld id="{4A19112C-D1F7-4C7E-AFD6-5B38FDB92513}" type="datetimeFigureOut">
               <a:rPr lang="fr-FR" smtClean="0"/>
-              <a:t>18/12/2023</a:t>
+              <a:t>21/12/2023</a:t>
             </a:fld>
             <a:endParaRPr lang="fr-FR"/>
           </a:p>
@@ -589,7 +593,7 @@
           <a:p>
             <a:fld id="{4A19112C-D1F7-4C7E-AFD6-5B38FDB92513}" type="datetimeFigureOut">
               <a:rPr lang="fr-FR" smtClean="0"/>
-              <a:t>18/12/2023</a:t>
+              <a:t>21/12/2023</a:t>
             </a:fld>
             <a:endParaRPr lang="fr-FR"/>
           </a:p>
@@ -759,7 +763,7 @@
           <a:p>
             <a:fld id="{4A19112C-D1F7-4C7E-AFD6-5B38FDB92513}" type="datetimeFigureOut">
               <a:rPr lang="fr-FR" smtClean="0"/>
-              <a:t>18/12/2023</a:t>
+              <a:t>21/12/2023</a:t>
             </a:fld>
             <a:endParaRPr lang="fr-FR"/>
           </a:p>
@@ -1003,7 +1007,7 @@
           <a:p>
             <a:fld id="{4A19112C-D1F7-4C7E-AFD6-5B38FDB92513}" type="datetimeFigureOut">
               <a:rPr lang="fr-FR" smtClean="0"/>
-              <a:t>18/12/2023</a:t>
+              <a:t>21/12/2023</a:t>
             </a:fld>
             <a:endParaRPr lang="fr-FR"/>
           </a:p>
@@ -1235,7 +1239,7 @@
           <a:p>
             <a:fld id="{4A19112C-D1F7-4C7E-AFD6-5B38FDB92513}" type="datetimeFigureOut">
               <a:rPr lang="fr-FR" smtClean="0"/>
-              <a:t>18/12/2023</a:t>
+              <a:t>21/12/2023</a:t>
             </a:fld>
             <a:endParaRPr lang="fr-FR"/>
           </a:p>
@@ -1602,7 +1606,7 @@
           <a:p>
             <a:fld id="{4A19112C-D1F7-4C7E-AFD6-5B38FDB92513}" type="datetimeFigureOut">
               <a:rPr lang="fr-FR" smtClean="0"/>
-              <a:t>18/12/2023</a:t>
+              <a:t>21/12/2023</a:t>
             </a:fld>
             <a:endParaRPr lang="fr-FR"/>
           </a:p>
@@ -1720,7 +1724,7 @@
           <a:p>
             <a:fld id="{4A19112C-D1F7-4C7E-AFD6-5B38FDB92513}" type="datetimeFigureOut">
               <a:rPr lang="fr-FR" smtClean="0"/>
-              <a:t>18/12/2023</a:t>
+              <a:t>21/12/2023</a:t>
             </a:fld>
             <a:endParaRPr lang="fr-FR"/>
           </a:p>
@@ -1815,7 +1819,7 @@
           <a:p>
             <a:fld id="{4A19112C-D1F7-4C7E-AFD6-5B38FDB92513}" type="datetimeFigureOut">
               <a:rPr lang="fr-FR" smtClean="0"/>
-              <a:t>18/12/2023</a:t>
+              <a:t>21/12/2023</a:t>
             </a:fld>
             <a:endParaRPr lang="fr-FR"/>
           </a:p>
@@ -2092,7 +2096,7 @@
           <a:p>
             <a:fld id="{4A19112C-D1F7-4C7E-AFD6-5B38FDB92513}" type="datetimeFigureOut">
               <a:rPr lang="fr-FR" smtClean="0"/>
-              <a:t>18/12/2023</a:t>
+              <a:t>21/12/2023</a:t>
             </a:fld>
             <a:endParaRPr lang="fr-FR"/>
           </a:p>
@@ -2349,7 +2353,7 @@
           <a:p>
             <a:fld id="{4A19112C-D1F7-4C7E-AFD6-5B38FDB92513}" type="datetimeFigureOut">
               <a:rPr lang="fr-FR" smtClean="0"/>
-              <a:t>18/12/2023</a:t>
+              <a:t>21/12/2023</a:t>
             </a:fld>
             <a:endParaRPr lang="fr-FR"/>
           </a:p>
@@ -2562,7 +2566,7 @@
           <a:p>
             <a:fld id="{4A19112C-D1F7-4C7E-AFD6-5B38FDB92513}" type="datetimeFigureOut">
               <a:rPr lang="fr-FR" smtClean="0"/>
-              <a:t>18/12/2023</a:t>
+              <a:t>21/12/2023</a:t>
             </a:fld>
             <a:endParaRPr lang="fr-FR"/>
           </a:p>
@@ -3021,60 +3025,6 @@
       </p:sp>
       <p:sp>
         <p:nvSpPr>
-          <p:cNvPr id="5" name="Rectangle 4">
-            <a:extLst>
-              <a:ext uri="{FF2B5EF4-FFF2-40B4-BE49-F238E27FC236}">
-                <a16:creationId xmlns:a16="http://schemas.microsoft.com/office/drawing/2014/main" id="{6F2DD798-7C8B-6836-32C9-4B2101F18041}"/>
-              </a:ext>
-            </a:extLst>
-          </p:cNvPr>
-          <p:cNvSpPr/>
-          <p:nvPr/>
-        </p:nvSpPr>
-        <p:spPr>
-          <a:xfrm>
-            <a:off x="4236720" y="2331720"/>
-            <a:ext cx="2407920" cy="9646920"/>
-          </a:xfrm>
-          <a:prstGeom prst="rect">
-            <a:avLst/>
-          </a:prstGeom>
-          <a:solidFill>
-            <a:schemeClr val="bg1"/>
-          </a:solidFill>
-          <a:ln>
-            <a:solidFill>
-              <a:srgbClr val="FF0000"/>
-            </a:solidFill>
-          </a:ln>
-        </p:spPr>
-        <p:style>
-          <a:lnRef idx="2">
-            <a:schemeClr val="accent1">
-              <a:shade val="15000"/>
-            </a:schemeClr>
-          </a:lnRef>
-          <a:fillRef idx="1">
-            <a:schemeClr val="accent1"/>
-          </a:fillRef>
-          <a:effectRef idx="0">
-            <a:schemeClr val="accent1"/>
-          </a:effectRef>
-          <a:fontRef idx="minor">
-            <a:schemeClr val="lt1"/>
-          </a:fontRef>
-        </p:style>
-        <p:txBody>
-          <a:bodyPr rtlCol="0" anchor="ctr"/>
-          <a:lstStyle/>
-          <a:p>
-            <a:pPr algn="ctr"/>
-            <a:endParaRPr lang="fr-FR"/>
-          </a:p>
-        </p:txBody>
-      </p:sp>
-      <p:sp>
-        <p:nvSpPr>
           <p:cNvPr id="6" name="Rectangle 5">
             <a:extLst>
               <a:ext uri="{FF2B5EF4-FFF2-40B4-BE49-F238E27FC236}">
@@ -3087,8 +3037,8 @@
         </p:nvSpPr>
         <p:spPr>
           <a:xfrm>
-            <a:off x="213360" y="2331720"/>
-            <a:ext cx="3886199" cy="9646920"/>
+            <a:off x="213360" y="3343727"/>
+            <a:ext cx="6431280" cy="8684263"/>
           </a:xfrm>
           <a:prstGeom prst="rect">
             <a:avLst/>
@@ -3283,10 +3233,152 @@
       </p:sp>
       <p:sp>
         <p:nvSpPr>
-          <p:cNvPr id="10" name="Rectangle 9">
+          <p:cNvPr id="2" name="ZoneTexte 1">
             <a:extLst>
               <a:ext uri="{FF2B5EF4-FFF2-40B4-BE49-F238E27FC236}">
-                <a16:creationId xmlns:a16="http://schemas.microsoft.com/office/drawing/2014/main" id="{14C95755-171A-CB26-A7E5-C716BD531BB7}"/>
+                <a16:creationId xmlns:a16="http://schemas.microsoft.com/office/drawing/2014/main" id="{8731DB25-0BEC-D164-74DF-75285C0240D4}"/>
+              </a:ext>
+            </a:extLst>
+          </p:cNvPr>
+          <p:cNvSpPr txBox="1"/>
+          <p:nvPr/>
+        </p:nvSpPr>
+        <p:spPr>
+          <a:xfrm>
+            <a:off x="5474942" y="363303"/>
+            <a:ext cx="530915" cy="369332"/>
+          </a:xfrm>
+          <a:prstGeom prst="rect">
+            <a:avLst/>
+          </a:prstGeom>
+          <a:noFill/>
+        </p:spPr>
+        <p:txBody>
+          <a:bodyPr wrap="none" rtlCol="0">
+            <a:spAutoFit/>
+          </a:bodyPr>
+          <a:lstStyle/>
+          <a:p>
+            <a:r>
+              <a:rPr lang="fr-FR" dirty="0" err="1"/>
+              <a:t>img</a:t>
+            </a:r>
+            <a:endParaRPr lang="fr-FR" dirty="0"/>
+          </a:p>
+        </p:txBody>
+      </p:sp>
+      <p:sp>
+        <p:nvSpPr>
+          <p:cNvPr id="3" name="ZoneTexte 2">
+            <a:extLst>
+              <a:ext uri="{FF2B5EF4-FFF2-40B4-BE49-F238E27FC236}">
+                <a16:creationId xmlns:a16="http://schemas.microsoft.com/office/drawing/2014/main" id="{129D14A8-180C-C03C-93F2-EA4815D13CE0}"/>
+              </a:ext>
+            </a:extLst>
+          </p:cNvPr>
+          <p:cNvSpPr txBox="1"/>
+          <p:nvPr/>
+        </p:nvSpPr>
+        <p:spPr>
+          <a:xfrm>
+            <a:off x="762000" y="584924"/>
+            <a:ext cx="849913" cy="369332"/>
+          </a:xfrm>
+          <a:prstGeom prst="rect">
+            <a:avLst/>
+          </a:prstGeom>
+          <a:noFill/>
+        </p:spPr>
+        <p:txBody>
+          <a:bodyPr wrap="none" rtlCol="0">
+            <a:spAutoFit/>
+          </a:bodyPr>
+          <a:lstStyle/>
+          <a:p>
+            <a:r>
+              <a:rPr lang="fr-FR" dirty="0"/>
+              <a:t>header</a:t>
+            </a:r>
+          </a:p>
+        </p:txBody>
+      </p:sp>
+      <p:sp>
+        <p:nvSpPr>
+          <p:cNvPr id="10" name="ZoneTexte 9">
+            <a:extLst>
+              <a:ext uri="{FF2B5EF4-FFF2-40B4-BE49-F238E27FC236}">
+                <a16:creationId xmlns:a16="http://schemas.microsoft.com/office/drawing/2014/main" id="{86A0A0A2-6B8F-A5F1-36E0-7F05909ADD76}"/>
+              </a:ext>
+            </a:extLst>
+          </p:cNvPr>
+          <p:cNvSpPr txBox="1"/>
+          <p:nvPr/>
+        </p:nvSpPr>
+        <p:spPr>
+          <a:xfrm>
+            <a:off x="146496" y="935139"/>
+            <a:ext cx="636649" cy="369332"/>
+          </a:xfrm>
+          <a:prstGeom prst="rect">
+            <a:avLst/>
+          </a:prstGeom>
+          <a:noFill/>
+        </p:spPr>
+        <p:txBody>
+          <a:bodyPr wrap="none" rtlCol="0">
+            <a:spAutoFit/>
+          </a:bodyPr>
+          <a:lstStyle/>
+          <a:p>
+            <a:r>
+              <a:rPr lang="fr-FR" dirty="0" err="1"/>
+              <a:t>form</a:t>
+            </a:r>
+            <a:endParaRPr lang="fr-FR" dirty="0"/>
+          </a:p>
+        </p:txBody>
+      </p:sp>
+      <p:sp>
+        <p:nvSpPr>
+          <p:cNvPr id="11" name="ZoneTexte 10">
+            <a:extLst>
+              <a:ext uri="{FF2B5EF4-FFF2-40B4-BE49-F238E27FC236}">
+                <a16:creationId xmlns:a16="http://schemas.microsoft.com/office/drawing/2014/main" id="{4025AD77-228B-2992-4378-C0CFB40A52DF}"/>
+              </a:ext>
+            </a:extLst>
+          </p:cNvPr>
+          <p:cNvSpPr txBox="1"/>
+          <p:nvPr/>
+        </p:nvSpPr>
+        <p:spPr>
+          <a:xfrm>
+            <a:off x="280089" y="1415924"/>
+            <a:ext cx="463588" cy="369332"/>
+          </a:xfrm>
+          <a:prstGeom prst="rect">
+            <a:avLst/>
+          </a:prstGeom>
+          <a:noFill/>
+        </p:spPr>
+        <p:txBody>
+          <a:bodyPr wrap="none" rtlCol="0">
+            <a:spAutoFit/>
+          </a:bodyPr>
+          <a:lstStyle/>
+          <a:p>
+            <a:r>
+              <a:rPr lang="fr-FR" dirty="0"/>
+              <a:t>div</a:t>
+            </a:r>
+          </a:p>
+        </p:txBody>
+      </p:sp>
+      <p:sp>
+        <p:nvSpPr>
+          <p:cNvPr id="12" name="Rectangle 11">
+            <a:extLst>
+              <a:ext uri="{FF2B5EF4-FFF2-40B4-BE49-F238E27FC236}">
+                <a16:creationId xmlns:a16="http://schemas.microsoft.com/office/drawing/2014/main" id="{44EDCA58-5973-AEC5-3B0E-99232BCFD0F5}"/>
               </a:ext>
             </a:extLst>
           </p:cNvPr>
@@ -3295,141 +3387,7 @@
         </p:nvSpPr>
         <p:spPr>
           <a:xfrm>
-            <a:off x="341448" y="1480457"/>
-            <a:ext cx="6175466" cy="275772"/>
-          </a:xfrm>
-          <a:prstGeom prst="rect">
-            <a:avLst/>
-          </a:prstGeom>
-          <a:noFill/>
-          <a:ln>
-            <a:solidFill>
-              <a:schemeClr val="accent1"/>
-            </a:solidFill>
-          </a:ln>
-        </p:spPr>
-        <p:style>
-          <a:lnRef idx="2">
-            <a:schemeClr val="accent1">
-              <a:shade val="15000"/>
-            </a:schemeClr>
-          </a:lnRef>
-          <a:fillRef idx="1">
-            <a:schemeClr val="accent1"/>
-          </a:fillRef>
-          <a:effectRef idx="0">
-            <a:schemeClr val="accent1"/>
-          </a:effectRef>
-          <a:fontRef idx="minor">
-            <a:schemeClr val="lt1"/>
-          </a:fontRef>
-        </p:style>
-        <p:txBody>
-          <a:bodyPr rtlCol="0" anchor="ctr"/>
-          <a:lstStyle/>
-          <a:p>
-            <a:pPr algn="ctr"/>
-            <a:endParaRPr lang="fr-FR"/>
-          </a:p>
-        </p:txBody>
-      </p:sp>
-      <p:sp>
-        <p:nvSpPr>
-          <p:cNvPr id="11" name="Rectangle 10">
-            <a:extLst>
-              <a:ext uri="{FF2B5EF4-FFF2-40B4-BE49-F238E27FC236}">
-                <a16:creationId xmlns:a16="http://schemas.microsoft.com/office/drawing/2014/main" id="{724CB703-5076-34F4-E5D3-671F89FAE65E}"/>
-              </a:ext>
-            </a:extLst>
-          </p:cNvPr>
-          <p:cNvSpPr/>
-          <p:nvPr/>
-        </p:nvSpPr>
-        <p:spPr>
-          <a:xfrm>
-            <a:off x="341448" y="1836056"/>
-            <a:ext cx="6175466" cy="275772"/>
-          </a:xfrm>
-          <a:prstGeom prst="rect">
-            <a:avLst/>
-          </a:prstGeom>
-          <a:noFill/>
-          <a:ln>
-            <a:solidFill>
-              <a:schemeClr val="accent1"/>
-            </a:solidFill>
-          </a:ln>
-        </p:spPr>
-        <p:style>
-          <a:lnRef idx="2">
-            <a:schemeClr val="accent1">
-              <a:shade val="15000"/>
-            </a:schemeClr>
-          </a:lnRef>
-          <a:fillRef idx="1">
-            <a:schemeClr val="accent1"/>
-          </a:fillRef>
-          <a:effectRef idx="0">
-            <a:schemeClr val="accent1"/>
-          </a:effectRef>
-          <a:fontRef idx="minor">
-            <a:schemeClr val="lt1"/>
-          </a:fontRef>
-        </p:style>
-        <p:txBody>
-          <a:bodyPr rtlCol="0" anchor="ctr"/>
-          <a:lstStyle/>
-          <a:p>
-            <a:pPr algn="ctr"/>
-            <a:endParaRPr lang="fr-FR"/>
-          </a:p>
-        </p:txBody>
-      </p:sp>
-    </p:spTree>
-    <p:extLst>
-      <p:ext uri="{BB962C8B-B14F-4D97-AF65-F5344CB8AC3E}">
-        <p14:creationId xmlns:p14="http://schemas.microsoft.com/office/powerpoint/2010/main" val="3775470095"/>
-      </p:ext>
-    </p:extLst>
-  </p:cSld>
-  <p:clrMapOvr>
-    <a:masterClrMapping/>
-  </p:clrMapOvr>
-</p:sld>
-</file>
-
-<file path=ppt/slides/slide2.xml><?xml version="1.0" encoding="utf-8"?>
-<p:sld xmlns:a="http://schemas.openxmlformats.org/drawingml/2006/main" xmlns:r="http://schemas.openxmlformats.org/officeDocument/2006/relationships" xmlns:p="http://schemas.openxmlformats.org/presentationml/2006/main">
-  <p:cSld>
-    <p:spTree>
-      <p:nvGrpSpPr>
-        <p:cNvPr id="1" name=""/>
-        <p:cNvGrpSpPr/>
-        <p:nvPr/>
-      </p:nvGrpSpPr>
-      <p:grpSpPr>
-        <a:xfrm>
-          <a:off x="0" y="0"/>
-          <a:ext cx="0" cy="0"/>
-          <a:chOff x="0" y="0"/>
-          <a:chExt cx="0" cy="0"/>
-        </a:xfrm>
-      </p:grpSpPr>
-      <p:sp>
-        <p:nvSpPr>
-          <p:cNvPr id="4" name="Rectangle 3">
-            <a:extLst>
-              <a:ext uri="{FF2B5EF4-FFF2-40B4-BE49-F238E27FC236}">
-                <a16:creationId xmlns:a16="http://schemas.microsoft.com/office/drawing/2014/main" id="{211CA927-FC05-2E04-3680-3A6CB8866777}"/>
-              </a:ext>
-            </a:extLst>
-          </p:cNvPr>
-          <p:cNvSpPr/>
-          <p:nvPr/>
-        </p:nvSpPr>
-        <p:spPr>
-          <a:xfrm>
-            <a:off x="213360" y="1378857"/>
+            <a:off x="213360" y="2317568"/>
             <a:ext cx="6431280" cy="812799"/>
           </a:xfrm>
           <a:prstGeom prst="rect">
@@ -3469,263 +3427,107 @@
       </p:sp>
       <p:sp>
         <p:nvSpPr>
-          <p:cNvPr id="5" name="Rectangle 4">
+          <p:cNvPr id="13" name="ZoneTexte 12">
             <a:extLst>
               <a:ext uri="{FF2B5EF4-FFF2-40B4-BE49-F238E27FC236}">
-                <a16:creationId xmlns:a16="http://schemas.microsoft.com/office/drawing/2014/main" id="{6F2DD798-7C8B-6836-32C9-4B2101F18041}"/>
+                <a16:creationId xmlns:a16="http://schemas.microsoft.com/office/drawing/2014/main" id="{B1BA2509-4887-08F2-174B-CE121DFA666C}"/>
               </a:ext>
             </a:extLst>
           </p:cNvPr>
-          <p:cNvSpPr/>
+          <p:cNvSpPr txBox="1"/>
           <p:nvPr/>
         </p:nvSpPr>
         <p:spPr>
           <a:xfrm>
-            <a:off x="213360" y="7108375"/>
-            <a:ext cx="6431280" cy="4895669"/>
-          </a:xfrm>
-          <a:prstGeom prst="rect">
-            <a:avLst/>
-          </a:prstGeom>
-          <a:solidFill>
-            <a:schemeClr val="bg1"/>
-          </a:solidFill>
-          <a:ln>
-            <a:solidFill>
-              <a:srgbClr val="FF0000"/>
-            </a:solidFill>
-          </a:ln>
-        </p:spPr>
-        <p:style>
-          <a:lnRef idx="2">
-            <a:schemeClr val="accent1">
-              <a:shade val="15000"/>
-            </a:schemeClr>
-          </a:lnRef>
-          <a:fillRef idx="1">
-            <a:schemeClr val="accent1"/>
-          </a:fillRef>
-          <a:effectRef idx="0">
-            <a:schemeClr val="accent1"/>
-          </a:effectRef>
-          <a:fontRef idx="minor">
-            <a:schemeClr val="lt1"/>
-          </a:fontRef>
-        </p:style>
-        <p:txBody>
-          <a:bodyPr rtlCol="0" anchor="ctr"/>
-          <a:lstStyle/>
-          <a:p>
-            <a:pPr algn="ctr"/>
-            <a:endParaRPr lang="fr-FR"/>
-          </a:p>
-        </p:txBody>
-      </p:sp>
-      <p:sp>
-        <p:nvSpPr>
-          <p:cNvPr id="6" name="Rectangle 5">
-            <a:extLst>
-              <a:ext uri="{FF2B5EF4-FFF2-40B4-BE49-F238E27FC236}">
-                <a16:creationId xmlns:a16="http://schemas.microsoft.com/office/drawing/2014/main" id="{02D3EEDE-5E89-878D-17C9-473058F8B39A}"/>
-              </a:ext>
-            </a:extLst>
-          </p:cNvPr>
-          <p:cNvSpPr/>
-          <p:nvPr/>
-        </p:nvSpPr>
-        <p:spPr>
-          <a:xfrm>
-            <a:off x="213360" y="2331720"/>
-            <a:ext cx="6431280" cy="4636591"/>
+            <a:off x="233026" y="2317568"/>
+            <a:ext cx="463588" cy="369332"/>
           </a:xfrm>
           <a:prstGeom prst="rect">
             <a:avLst/>
           </a:prstGeom>
           <a:noFill/>
-          <a:ln>
-            <a:solidFill>
-              <a:schemeClr val="accent6"/>
-            </a:solidFill>
-          </a:ln>
         </p:spPr>
-        <p:style>
-          <a:lnRef idx="2">
-            <a:schemeClr val="accent1">
-              <a:shade val="15000"/>
-            </a:schemeClr>
-          </a:lnRef>
-          <a:fillRef idx="1">
-            <a:schemeClr val="accent1"/>
-          </a:fillRef>
-          <a:effectRef idx="0">
-            <a:schemeClr val="accent1"/>
-          </a:effectRef>
-          <a:fontRef idx="minor">
-            <a:schemeClr val="lt1"/>
-          </a:fontRef>
-        </p:style>
-        <p:txBody>
-          <a:bodyPr rtlCol="0" anchor="ctr"/>
-          <a:lstStyle/>
-          <a:p>
-            <a:pPr algn="ctr"/>
-            <a:endParaRPr lang="fr-FR"/>
-          </a:p>
-        </p:txBody>
-      </p:sp>
-      <p:sp>
-        <p:nvSpPr>
-          <p:cNvPr id="7" name="Rectangle 6">
+        <p:txBody>
+          <a:bodyPr wrap="none" rtlCol="0">
+            <a:spAutoFit/>
+          </a:bodyPr>
+          <a:lstStyle/>
+          <a:p>
+            <a:r>
+              <a:rPr lang="fr-FR" dirty="0"/>
+              <a:t>div</a:t>
+            </a:r>
+          </a:p>
+        </p:txBody>
+      </p:sp>
+      <p:sp>
+        <p:nvSpPr>
+          <p:cNvPr id="14" name="ZoneTexte 13">
             <a:extLst>
               <a:ext uri="{FF2B5EF4-FFF2-40B4-BE49-F238E27FC236}">
-                <a16:creationId xmlns:a16="http://schemas.microsoft.com/office/drawing/2014/main" id="{60BC6335-A43C-5E0A-BCC2-CD58F2D56C9B}"/>
+                <a16:creationId xmlns:a16="http://schemas.microsoft.com/office/drawing/2014/main" id="{A72422A7-770A-B927-5908-D1A7B464DEC9}"/>
               </a:ext>
             </a:extLst>
           </p:cNvPr>
-          <p:cNvSpPr/>
+          <p:cNvSpPr txBox="1"/>
           <p:nvPr/>
         </p:nvSpPr>
         <p:spPr>
           <a:xfrm>
-            <a:off x="4963886" y="294639"/>
-            <a:ext cx="1553028" cy="580570"/>
+            <a:off x="280089" y="3343727"/>
+            <a:ext cx="484428" cy="369332"/>
           </a:xfrm>
           <a:prstGeom prst="rect">
             <a:avLst/>
           </a:prstGeom>
           <a:noFill/>
-          <a:ln>
-            <a:solidFill>
-              <a:schemeClr val="accent4"/>
-            </a:solidFill>
-          </a:ln>
         </p:spPr>
-        <p:style>
-          <a:lnRef idx="2">
-            <a:schemeClr val="accent1">
-              <a:shade val="15000"/>
-            </a:schemeClr>
-          </a:lnRef>
-          <a:fillRef idx="1">
-            <a:schemeClr val="accent1"/>
-          </a:fillRef>
-          <a:effectRef idx="0">
-            <a:schemeClr val="accent1"/>
-          </a:effectRef>
-          <a:fontRef idx="minor">
-            <a:schemeClr val="lt1"/>
-          </a:fontRef>
-        </p:style>
-        <p:txBody>
-          <a:bodyPr rtlCol="0" anchor="ctr"/>
-          <a:lstStyle/>
-          <a:p>
-            <a:pPr algn="ctr"/>
-            <a:endParaRPr lang="fr-FR"/>
-          </a:p>
-        </p:txBody>
-      </p:sp>
-      <p:sp>
-        <p:nvSpPr>
-          <p:cNvPr id="8" name="Rectangle 7">
+        <p:txBody>
+          <a:bodyPr wrap="none" rtlCol="0">
+            <a:spAutoFit/>
+          </a:bodyPr>
+          <a:lstStyle/>
+          <a:p>
+            <a:r>
+              <a:rPr lang="fr-FR" dirty="0"/>
+              <a:t>Div</a:t>
+            </a:r>
+          </a:p>
+        </p:txBody>
+      </p:sp>
+      <p:sp>
+        <p:nvSpPr>
+          <p:cNvPr id="15" name="ZoneTexte 14">
             <a:extLst>
               <a:ext uri="{FF2B5EF4-FFF2-40B4-BE49-F238E27FC236}">
-                <a16:creationId xmlns:a16="http://schemas.microsoft.com/office/drawing/2014/main" id="{0BAC3E85-D69C-6927-63A6-5D4F4A815F42}"/>
+                <a16:creationId xmlns:a16="http://schemas.microsoft.com/office/drawing/2014/main" id="{34127C7A-E7A6-FDEF-B813-C26A3620FA57}"/>
               </a:ext>
             </a:extLst>
           </p:cNvPr>
-          <p:cNvSpPr/>
+          <p:cNvSpPr txBox="1"/>
           <p:nvPr/>
         </p:nvSpPr>
         <p:spPr>
           <a:xfrm>
-            <a:off x="167640" y="164010"/>
-            <a:ext cx="6477000" cy="841829"/>
+            <a:off x="2193471" y="5141893"/>
+            <a:ext cx="3013166" cy="954107"/>
           </a:xfrm>
           <a:prstGeom prst="rect">
             <a:avLst/>
           </a:prstGeom>
           <a:noFill/>
-          <a:ln>
-            <a:solidFill>
-              <a:schemeClr val="accent1"/>
-            </a:solidFill>
-          </a:ln>
         </p:spPr>
-        <p:style>
-          <a:lnRef idx="2">
-            <a:schemeClr val="accent1">
-              <a:shade val="15000"/>
-            </a:schemeClr>
-          </a:lnRef>
-          <a:fillRef idx="1">
-            <a:schemeClr val="accent1"/>
-          </a:fillRef>
-          <a:effectRef idx="0">
-            <a:schemeClr val="accent1"/>
-          </a:effectRef>
-          <a:fontRef idx="minor">
-            <a:schemeClr val="lt1"/>
-          </a:fontRef>
-        </p:style>
-        <p:txBody>
-          <a:bodyPr rtlCol="0" anchor="ctr"/>
+        <p:txBody>
+          <a:bodyPr wrap="square" rtlCol="0">
+            <a:spAutoFit/>
+          </a:bodyPr>
           <a:lstStyle/>
           <a:p>
             <a:pPr algn="ctr"/>
-            <a:endParaRPr lang="fr-FR"/>
-          </a:p>
-        </p:txBody>
-      </p:sp>
-      <p:sp>
-        <p:nvSpPr>
-          <p:cNvPr id="9" name="Rectangle 8">
-            <a:extLst>
-              <a:ext uri="{FF2B5EF4-FFF2-40B4-BE49-F238E27FC236}">
-                <a16:creationId xmlns:a16="http://schemas.microsoft.com/office/drawing/2014/main" id="{855FA119-A9CD-0E21-D671-0697FC917877}"/>
-              </a:ext>
-            </a:extLst>
-          </p:cNvPr>
-          <p:cNvSpPr/>
-          <p:nvPr/>
-        </p:nvSpPr>
-        <p:spPr>
-          <a:xfrm>
-            <a:off x="167640" y="1219199"/>
-            <a:ext cx="6522720" cy="10972801"/>
-          </a:xfrm>
-          <a:prstGeom prst="rect">
-            <a:avLst/>
-          </a:prstGeom>
-          <a:noFill/>
-          <a:ln>
-            <a:solidFill>
-              <a:schemeClr val="tx1"/>
-            </a:solidFill>
-          </a:ln>
-        </p:spPr>
-        <p:style>
-          <a:lnRef idx="2">
-            <a:schemeClr val="accent1">
-              <a:shade val="15000"/>
-            </a:schemeClr>
-          </a:lnRef>
-          <a:fillRef idx="1">
-            <a:schemeClr val="accent1"/>
-          </a:fillRef>
-          <a:effectRef idx="0">
-            <a:schemeClr val="accent1"/>
-          </a:effectRef>
-          <a:fontRef idx="minor">
-            <a:schemeClr val="lt1"/>
-          </a:fontRef>
-        </p:style>
-        <p:txBody>
-          <a:bodyPr rtlCol="0" anchor="ctr"/>
-          <a:lstStyle/>
-          <a:p>
-            <a:pPr algn="ctr"/>
-            <a:endParaRPr lang="fr-FR"/>
+            <a:r>
+              <a:rPr lang="fr-FR" sz="2800" dirty="0"/>
+              <a:t>Généré a partir d’un JSON</a:t>
+            </a:r>
           </a:p>
         </p:txBody>
       </p:sp>

</xml_diff>